<commit_message>
Finish FutureTask part of the presentation.
</commit_message>
<xml_diff>
--- a/presentation/CallableFutureTask.pptx
+++ b/presentation/CallableFutureTask.pptx
@@ -6108,7 +6108,7 @@
         <p:spPr>
           <a:xfrm>
             <a:off x="684212" y="2286001"/>
-            <a:ext cx="8535988" cy="3643312"/>
+            <a:ext cx="4776788" cy="3643312"/>
           </a:xfrm>
         </p:spPr>
         <p:txBody>
@@ -6118,10 +6118,237 @@
           <a:lstStyle/>
           <a:p>
             <a:pPr marL="342900" indent="-342900">
-              <a:buFontTx/>
-              <a:buChar char="-"/>
+              <a:buFont typeface="Wingdings" panose="05000000000000000000" pitchFamily="2" charset="2"/>
+              <a:buChar char="Ø"/>
             </a:pPr>
-            <a:endParaRPr lang="fr-CH" dirty="0"/>
+            <a:r>
+              <a:rPr lang="fr-CH" dirty="0" err="1" smtClean="0">
+                <a:solidFill>
+                  <a:schemeClr val="tx1"/>
+                </a:solidFill>
+              </a:rPr>
+              <a:t>Provide</a:t>
+            </a:r>
+            <a:r>
+              <a:rPr lang="fr-CH" dirty="0" smtClean="0">
+                <a:solidFill>
+                  <a:schemeClr val="tx1"/>
+                </a:solidFill>
+              </a:rPr>
+              <a:t> the user </a:t>
+            </a:r>
+            <a:r>
+              <a:rPr lang="fr-CH" dirty="0" err="1" smtClean="0">
+                <a:solidFill>
+                  <a:schemeClr val="tx1"/>
+                </a:solidFill>
+              </a:rPr>
+              <a:t>with</a:t>
+            </a:r>
+            <a:r>
+              <a:rPr lang="fr-CH" dirty="0" smtClean="0">
+                <a:solidFill>
+                  <a:schemeClr val="tx1"/>
+                </a:solidFill>
+              </a:rPr>
+              <a:t> </a:t>
+            </a:r>
+            <a:r>
+              <a:rPr lang="fr-CH" dirty="0" err="1" smtClean="0">
+                <a:solidFill>
+                  <a:schemeClr val="tx1"/>
+                </a:solidFill>
+              </a:rPr>
+              <a:t>possibility</a:t>
+            </a:r>
+            <a:r>
+              <a:rPr lang="fr-CH" dirty="0" smtClean="0">
+                <a:solidFill>
+                  <a:schemeClr val="tx1"/>
+                </a:solidFill>
+              </a:rPr>
+              <a:t> to</a:t>
+            </a:r>
+            <a:r>
+              <a:rPr lang="fr-CH" dirty="0">
+                <a:solidFill>
+                  <a:schemeClr val="tx1"/>
+                </a:solidFill>
+              </a:rPr>
+              <a:t> </a:t>
+            </a:r>
+            <a:r>
+              <a:rPr lang="fr-CH" dirty="0" smtClean="0">
+                <a:solidFill>
+                  <a:schemeClr val="tx1"/>
+                </a:solidFill>
+              </a:rPr>
+              <a:t>cancel the running </a:t>
+            </a:r>
+            <a:r>
+              <a:rPr lang="fr-CH" dirty="0" err="1" smtClean="0">
+                <a:solidFill>
+                  <a:schemeClr val="tx1"/>
+                </a:solidFill>
+              </a:rPr>
+              <a:t>task</a:t>
+            </a:r>
+            <a:r>
+              <a:rPr lang="fr-CH" dirty="0" smtClean="0">
+                <a:solidFill>
+                  <a:schemeClr val="tx1"/>
+                </a:solidFill>
+              </a:rPr>
+              <a:t>.</a:t>
+            </a:r>
+          </a:p>
+          <a:p>
+            <a:pPr marL="342900" indent="-342900">
+              <a:buFont typeface="Wingdings" panose="05000000000000000000" pitchFamily="2" charset="2"/>
+              <a:buChar char="Ø"/>
+            </a:pPr>
+            <a:r>
+              <a:rPr lang="fr-CH" dirty="0" err="1" smtClean="0">
+                <a:solidFill>
+                  <a:schemeClr val="tx1"/>
+                </a:solidFill>
+              </a:rPr>
+              <a:t>Provide</a:t>
+            </a:r>
+            <a:r>
+              <a:rPr lang="fr-CH" dirty="0" smtClean="0">
+                <a:solidFill>
+                  <a:schemeClr val="tx1"/>
+                </a:solidFill>
+              </a:rPr>
+              <a:t> the user the </a:t>
+            </a:r>
+            <a:r>
+              <a:rPr lang="fr-CH" dirty="0" err="1" smtClean="0">
+                <a:solidFill>
+                  <a:schemeClr val="tx1"/>
+                </a:solidFill>
+              </a:rPr>
+              <a:t>possiblity</a:t>
+            </a:r>
+            <a:r>
+              <a:rPr lang="fr-CH" dirty="0" smtClean="0">
+                <a:solidFill>
+                  <a:schemeClr val="tx1"/>
+                </a:solidFill>
+              </a:rPr>
+              <a:t> to show the </a:t>
+            </a:r>
+            <a:r>
+              <a:rPr lang="fr-CH" dirty="0" err="1" smtClean="0">
+                <a:solidFill>
+                  <a:schemeClr val="tx1"/>
+                </a:solidFill>
+              </a:rPr>
+              <a:t>task</a:t>
+            </a:r>
+            <a:r>
+              <a:rPr lang="fr-CH" dirty="0" err="1" smtClean="0">
+                <a:solidFill>
+                  <a:schemeClr val="tx1"/>
+                </a:solidFill>
+              </a:rPr>
+              <a:t>’s</a:t>
+            </a:r>
+            <a:r>
+              <a:rPr lang="fr-CH" dirty="0" smtClean="0">
+                <a:solidFill>
+                  <a:schemeClr val="tx1"/>
+                </a:solidFill>
+              </a:rPr>
+              <a:t> </a:t>
+            </a:r>
+            <a:r>
+              <a:rPr lang="fr-CH" dirty="0" err="1" smtClean="0">
+                <a:solidFill>
+                  <a:schemeClr val="tx1"/>
+                </a:solidFill>
+              </a:rPr>
+              <a:t>work</a:t>
+            </a:r>
+            <a:r>
+              <a:rPr lang="fr-CH" dirty="0" smtClean="0">
+                <a:solidFill>
+                  <a:schemeClr val="tx1"/>
+                </a:solidFill>
+              </a:rPr>
+              <a:t> in </a:t>
+            </a:r>
+            <a:r>
+              <a:rPr lang="fr-CH" dirty="0" err="1" smtClean="0">
+                <a:solidFill>
+                  <a:schemeClr val="tx1"/>
+                </a:solidFill>
+              </a:rPr>
+              <a:t>progress</a:t>
+            </a:r>
+            <a:r>
+              <a:rPr lang="fr-CH" dirty="0" smtClean="0">
+                <a:solidFill>
+                  <a:schemeClr val="tx1"/>
+                </a:solidFill>
+              </a:rPr>
+              <a:t>.</a:t>
+            </a:r>
+          </a:p>
+          <a:p>
+            <a:pPr marL="342900" indent="-342900">
+              <a:buFont typeface="Wingdings" panose="05000000000000000000" pitchFamily="2" charset="2"/>
+              <a:buChar char="Ø"/>
+            </a:pPr>
+            <a:r>
+              <a:rPr lang="fr-CH" dirty="0" err="1" smtClean="0">
+                <a:solidFill>
+                  <a:schemeClr val="tx1"/>
+                </a:solidFill>
+              </a:rPr>
+              <a:t>Wait</a:t>
+            </a:r>
+            <a:r>
+              <a:rPr lang="fr-CH" dirty="0" smtClean="0">
+                <a:solidFill>
+                  <a:schemeClr val="tx1"/>
+                </a:solidFill>
+              </a:rPr>
+              <a:t> for the </a:t>
+            </a:r>
+            <a:r>
+              <a:rPr lang="fr-CH" dirty="0" err="1" smtClean="0">
+                <a:solidFill>
+                  <a:schemeClr val="tx1"/>
+                </a:solidFill>
+              </a:rPr>
+              <a:t>tasks’s</a:t>
+            </a:r>
+            <a:r>
+              <a:rPr lang="fr-CH" dirty="0" smtClean="0">
+                <a:solidFill>
+                  <a:schemeClr val="tx1"/>
+                </a:solidFill>
+              </a:rPr>
+              <a:t> </a:t>
+            </a:r>
+            <a:r>
+              <a:rPr lang="fr-CH" dirty="0" err="1" smtClean="0">
+                <a:solidFill>
+                  <a:schemeClr val="tx1"/>
+                </a:solidFill>
+              </a:rPr>
+              <a:t>result</a:t>
+            </a:r>
+            <a:r>
+              <a:rPr lang="fr-CH" dirty="0" smtClean="0">
+                <a:solidFill>
+                  <a:schemeClr val="tx1"/>
+                </a:solidFill>
+              </a:rPr>
+              <a:t>.</a:t>
+            </a:r>
           </a:p>
         </p:txBody>
       </p:sp>
@@ -6164,13 +6391,51 @@
           <a:lstStyle/>
           <a:p>
             <a:fld id="{5AB2EE26-ED9C-4A04-B78D-673AD8430FF9}" type="slidenum">
-              <a:rPr lang="fr-CH" smtClean="0"/>
+              <a:rPr lang="fr-CH" smtClean="0">
+                <a:solidFill>
+                  <a:schemeClr val="tx1"/>
+                </a:solidFill>
+              </a:rPr>
               <a:t>10</a:t>
             </a:fld>
-            <a:endParaRPr lang="fr-CH"/>
-          </a:p>
-        </p:txBody>
-      </p:sp>
+            <a:endParaRPr lang="fr-CH" dirty="0">
+              <a:solidFill>
+                <a:schemeClr val="tx1"/>
+              </a:solidFill>
+            </a:endParaRPr>
+          </a:p>
+        </p:txBody>
+      </p:sp>
+      <p:pic>
+        <p:nvPicPr>
+          <p:cNvPr id="3" name="Image 2"/>
+          <p:cNvPicPr>
+            <a:picLocks noChangeAspect="1"/>
+          </p:cNvPicPr>
+          <p:nvPr/>
+        </p:nvPicPr>
+        <p:blipFill>
+          <a:blip r:embed="rId2">
+            <a:extLst>
+              <a:ext uri="{28A0092B-C50C-407E-A947-70E740481C1C}">
+                <a14:useLocalDpi xmlns:a14="http://schemas.microsoft.com/office/drawing/2010/main" val="0"/>
+              </a:ext>
+            </a:extLst>
+          </a:blip>
+          <a:stretch>
+            <a:fillRect/>
+          </a:stretch>
+        </p:blipFill>
+        <p:spPr>
+          <a:xfrm>
+            <a:off x="5332840" y="1754381"/>
+            <a:ext cx="5601482" cy="4296375"/>
+          </a:xfrm>
+          <a:prstGeom prst="rect">
+            <a:avLst/>
+          </a:prstGeom>
+        </p:spPr>
+      </p:pic>
     </p:spTree>
     <p:extLst>
       <p:ext uri="{BB962C8B-B14F-4D97-AF65-F5344CB8AC3E}">
@@ -6227,23 +6492,7 @@
             </a:r>
             <a:r>
               <a:rPr lang="fr-CH" dirty="0" err="1" smtClean="0"/>
-              <a:t>Futuretask</a:t>
-            </a:r>
-            <a:r>
-              <a:rPr lang="fr-CH" dirty="0" smtClean="0"/>
-              <a:t> –</a:t>
-            </a:r>
-            <a:r>
-              <a:rPr lang="fr-CH" dirty="0"/>
-              <a:t> </a:t>
-            </a:r>
-            <a:r>
-              <a:rPr lang="fr-CH" dirty="0" err="1" smtClean="0"/>
-              <a:t>example</a:t>
-            </a:r>
-            <a:r>
-              <a:rPr lang="fr-CH" dirty="0" smtClean="0"/>
-              <a:t> / CODE</a:t>
+              <a:t>Demo</a:t>
             </a:r>
             <a:endParaRPr lang="fr-CH" dirty="0"/>
           </a:p>
@@ -6318,10 +6567,18 @@
           <a:lstStyle/>
           <a:p>
             <a:fld id="{5AB2EE26-ED9C-4A04-B78D-673AD8430FF9}" type="slidenum">
-              <a:rPr lang="fr-CH" smtClean="0"/>
+              <a:rPr lang="fr-CH" smtClean="0">
+                <a:solidFill>
+                  <a:schemeClr val="tx1"/>
+                </a:solidFill>
+              </a:rPr>
               <a:t>11</a:t>
             </a:fld>
-            <a:endParaRPr lang="fr-CH"/>
+            <a:endParaRPr lang="fr-CH" dirty="0">
+              <a:solidFill>
+                <a:schemeClr val="tx1"/>
+              </a:solidFill>
+            </a:endParaRPr>
           </a:p>
         </p:txBody>
       </p:sp>
@@ -6452,10 +6709,18 @@
           <a:lstStyle/>
           <a:p>
             <a:fld id="{5AB2EE26-ED9C-4A04-B78D-673AD8430FF9}" type="slidenum">
-              <a:rPr lang="fr-CH" smtClean="0"/>
+              <a:rPr lang="fr-CH" smtClean="0">
+                <a:solidFill>
+                  <a:schemeClr val="tx1"/>
+                </a:solidFill>
+              </a:rPr>
               <a:t>12</a:t>
             </a:fld>
-            <a:endParaRPr lang="fr-CH"/>
+            <a:endParaRPr lang="fr-CH" dirty="0">
+              <a:solidFill>
+                <a:schemeClr val="tx1"/>
+              </a:solidFill>
+            </a:endParaRPr>
           </a:p>
         </p:txBody>
       </p:sp>
@@ -6468,14 +6733,14 @@
           <p:nvPr>
             <p:extLst>
               <p:ext uri="{D42A27DB-BD31-4B8C-83A1-F6EECF244321}">
-                <p14:modId xmlns:p14="http://schemas.microsoft.com/office/powerpoint/2010/main" val="2622938537"/>
+                <p14:modId xmlns:p14="http://schemas.microsoft.com/office/powerpoint/2010/main" val="1021687532"/>
               </p:ext>
             </p:extLst>
           </p:nvPr>
         </p:nvGraphicFramePr>
         <p:xfrm>
           <a:off x="1092201" y="2691341"/>
-          <a:ext cx="8127999" cy="2595880"/>
+          <a:ext cx="9650412" cy="3042920"/>
         </p:xfrm>
         <a:graphic>
           <a:graphicData uri="http://schemas.openxmlformats.org/drawingml/2006/table">
@@ -6484,9 +6749,9 @@
                 <a:tableStyleId>{5C22544A-7EE6-4342-B048-85BDC9FD1C3A}</a:tableStyleId>
               </a:tblPr>
               <a:tblGrid>
-                <a:gridCol w="2709333"/>
-                <a:gridCol w="2709333"/>
-                <a:gridCol w="2709333"/>
+                <a:gridCol w="3216804"/>
+                <a:gridCol w="3216804"/>
+                <a:gridCol w="3216804"/>
               </a:tblGrid>
               <a:tr h="370840">
                 <a:tc>
@@ -6508,10 +6773,6 @@
                         <a:rPr lang="fr-CH" dirty="0" err="1" smtClean="0"/>
                         <a:t>Callable</a:t>
                       </a:r>
-                      <a:r>
-                        <a:rPr lang="fr-CH" dirty="0" smtClean="0"/>
-                        <a:t> class</a:t>
-                      </a:r>
                       <a:endParaRPr lang="fr-CH" dirty="0"/>
                     </a:p>
                   </a:txBody>
@@ -6525,10 +6786,6 @@
                       <a:r>
                         <a:rPr lang="fr-CH" dirty="0" err="1" smtClean="0"/>
                         <a:t>FutureTask</a:t>
-                      </a:r>
-                      <a:r>
-                        <a:rPr lang="fr-CH" dirty="0" smtClean="0"/>
-                        <a:t> class</a:t>
                       </a:r>
                       <a:endParaRPr lang="fr-CH" dirty="0"/>
                     </a:p>
@@ -6578,6 +6835,10 @@
                     <a:bodyPr/>
                     <a:lstStyle/>
                     <a:p>
+                      <a:pPr marL="285750" indent="-285750">
+                        <a:buFont typeface="Arial" panose="020B0604020202020204" pitchFamily="34" charset="0"/>
+                        <a:buChar char="•"/>
+                      </a:pPr>
                       <a:r>
                         <a:rPr lang="fr-CH" dirty="0" err="1" smtClean="0"/>
                         <a:t>get</a:t>
@@ -6601,6 +6862,41 @@
                       <a:r>
                         <a:rPr lang="fr-CH" baseline="0" dirty="0" err="1" smtClean="0"/>
                         <a:t>task</a:t>
+                      </a:r>
+                      <a:endParaRPr lang="fr-CH" baseline="0" dirty="0" smtClean="0"/>
+                    </a:p>
+                    <a:p>
+                      <a:pPr marL="285750" indent="-285750">
+                        <a:buFont typeface="Arial" panose="020B0604020202020204" pitchFamily="34" charset="0"/>
+                        <a:buChar char="•"/>
+                      </a:pPr>
+                      <a:r>
+                        <a:rPr lang="fr-CH" baseline="0" dirty="0" err="1" smtClean="0"/>
+                        <a:t>allow</a:t>
+                      </a:r>
+                      <a:r>
+                        <a:rPr lang="fr-CH" baseline="0" dirty="0" smtClean="0"/>
+                        <a:t> modification of the </a:t>
+                      </a:r>
+                      <a:r>
+                        <a:rPr lang="fr-CH" baseline="0" dirty="0" err="1" smtClean="0"/>
+                        <a:t>wrapped</a:t>
+                      </a:r>
+                      <a:r>
+                        <a:rPr lang="fr-CH" baseline="0" dirty="0" smtClean="0"/>
+                        <a:t> </a:t>
+                      </a:r>
+                      <a:r>
+                        <a:rPr lang="fr-CH" baseline="0" dirty="0" err="1" smtClean="0"/>
+                        <a:t>Callable</a:t>
+                      </a:r>
+                      <a:r>
+                        <a:rPr lang="fr-CH" baseline="0" dirty="0" smtClean="0"/>
+                        <a:t> or </a:t>
+                      </a:r>
+                      <a:r>
+                        <a:rPr lang="fr-CH" baseline="0" dirty="0" err="1" smtClean="0"/>
+                        <a:t>Runnable</a:t>
                       </a:r>
                       <a:endParaRPr lang="fr-CH" dirty="0"/>
                     </a:p>
@@ -6646,6 +6942,14 @@
                     <a:bodyPr/>
                     <a:lstStyle/>
                     <a:p>
+                      <a:r>
+                        <a:rPr lang="fr-CH" dirty="0" err="1" smtClean="0"/>
+                        <a:t>RunnableFuture</a:t>
+                      </a:r>
+                      <a:r>
+                        <a:rPr lang="fr-CH" dirty="0" smtClean="0"/>
+                        <a:t>&lt;Type&gt;</a:t>
+                      </a:r>
                       <a:endParaRPr lang="fr-CH" dirty="0"/>
                     </a:p>
                   </a:txBody>
@@ -6694,7 +6998,11 @@
                     <a:bodyPr/>
                     <a:lstStyle/>
                     <a:p>
-                      <a:endParaRPr lang="fr-CH"/>
+                      <a:r>
+                        <a:rPr lang="fr-CH" dirty="0" smtClean="0"/>
+                        <a:t>-</a:t>
+                      </a:r>
+                      <a:endParaRPr lang="fr-CH" dirty="0"/>
                     </a:p>
                   </a:txBody>
                   <a:tcPr/>
@@ -6706,6 +7014,10 @@
                     <a:bodyPr/>
                     <a:lstStyle/>
                     <a:p>
+                      <a:r>
+                        <a:rPr lang="fr-CH" dirty="0" smtClean="0"/>
+                        <a:t>type</a:t>
+                      </a:r>
                       <a:endParaRPr lang="fr-CH" dirty="0"/>
                     </a:p>
                   </a:txBody>
@@ -6716,7 +7028,11 @@
                     <a:bodyPr/>
                     <a:lstStyle/>
                     <a:p>
-                      <a:endParaRPr lang="fr-CH"/>
+                      <a:r>
+                        <a:rPr lang="fr-CH" dirty="0" smtClean="0"/>
+                        <a:t>interface</a:t>
+                      </a:r>
+                      <a:endParaRPr lang="fr-CH" dirty="0"/>
                     </a:p>
                   </a:txBody>
                   <a:tcPr/>
@@ -6726,7 +7042,11 @@
                     <a:bodyPr/>
                     <a:lstStyle/>
                     <a:p>
-                      <a:endParaRPr lang="fr-CH"/>
+                      <a:r>
+                        <a:rPr lang="fr-CH" dirty="0" smtClean="0"/>
+                        <a:t>class</a:t>
+                      </a:r>
+                      <a:endParaRPr lang="fr-CH" dirty="0"/>
                     </a:p>
                   </a:txBody>
                   <a:tcPr/>
@@ -6738,7 +7058,11 @@
                     <a:bodyPr/>
                     <a:lstStyle/>
                     <a:p>
-                      <a:endParaRPr lang="fr-CH"/>
+                      <a:r>
+                        <a:rPr lang="fr-CH" dirty="0" smtClean="0"/>
+                        <a:t>Exception handling</a:t>
+                      </a:r>
+                      <a:endParaRPr lang="fr-CH" dirty="0"/>
                     </a:p>
                   </a:txBody>
                   <a:tcPr/>
@@ -6748,7 +7072,11 @@
                     <a:bodyPr/>
                     <a:lstStyle/>
                     <a:p>
-                      <a:endParaRPr lang="fr-CH"/>
+                      <a:r>
+                        <a:rPr lang="fr-CH" dirty="0" err="1" smtClean="0"/>
+                        <a:t>Yes</a:t>
+                      </a:r>
+                      <a:endParaRPr lang="fr-CH" dirty="0"/>
                     </a:p>
                   </a:txBody>
                   <a:tcPr/>
@@ -6758,38 +7086,10 @@
                     <a:bodyPr/>
                     <a:lstStyle/>
                     <a:p>
-                      <a:endParaRPr lang="fr-CH"/>
-                    </a:p>
-                  </a:txBody>
-                  <a:tcPr/>
-                </a:tc>
-              </a:tr>
-              <a:tr h="370840">
-                <a:tc>
-                  <a:txBody>
-                    <a:bodyPr/>
-                    <a:lstStyle/>
-                    <a:p>
-                      <a:endParaRPr lang="fr-CH"/>
-                    </a:p>
-                  </a:txBody>
-                  <a:tcPr/>
-                </a:tc>
-                <a:tc>
-                  <a:txBody>
-                    <a:bodyPr/>
-                    <a:lstStyle/>
-                    <a:p>
-                      <a:endParaRPr lang="fr-CH"/>
-                    </a:p>
-                  </a:txBody>
-                  <a:tcPr/>
-                </a:tc>
-                <a:tc>
-                  <a:txBody>
-                    <a:bodyPr/>
-                    <a:lstStyle/>
-                    <a:p>
+                      <a:r>
+                        <a:rPr lang="fr-CH" dirty="0" err="1" smtClean="0"/>
+                        <a:t>Yes</a:t>
+                      </a:r>
                       <a:endParaRPr lang="fr-CH" dirty="0"/>
                     </a:p>
                   </a:txBody>
@@ -7018,10 +7318,18 @@
           <a:lstStyle/>
           <a:p>
             <a:fld id="{5AB2EE26-ED9C-4A04-B78D-673AD8430FF9}" type="slidenum">
-              <a:rPr lang="fr-CH" smtClean="0"/>
+              <a:rPr lang="fr-CH" smtClean="0">
+                <a:solidFill>
+                  <a:schemeClr val="tx1"/>
+                </a:solidFill>
+              </a:rPr>
               <a:t>13</a:t>
             </a:fld>
-            <a:endParaRPr lang="fr-CH"/>
+            <a:endParaRPr lang="fr-CH" dirty="0">
+              <a:solidFill>
+                <a:schemeClr val="tx1"/>
+              </a:solidFill>
+            </a:endParaRPr>
           </a:p>
         </p:txBody>
       </p:sp>
@@ -7901,21 +8209,8 @@
                   <a:schemeClr val="tx1"/>
                 </a:solidFill>
               </a:rPr>
-              <a:t>We want to compute an Integral in order to get Pi and we want to compute </a:t>
-            </a:r>
-            <a:r>
-              <a:rPr lang="en-US" dirty="0" smtClean="0">
-                <a:solidFill>
-                  <a:schemeClr val="tx1"/>
-                </a:solidFill>
-              </a:rPr>
-              <a:t>in parallel.</a:t>
-            </a:r>
-            <a:endParaRPr lang="en-US" dirty="0" smtClean="0">
-              <a:solidFill>
-                <a:schemeClr val="tx1"/>
-              </a:solidFill>
-            </a:endParaRPr>
+              <a:t>We want to compute an Integral in order to get Pi and we want to compute in parallel.</a:t>
+            </a:r>
           </a:p>
           <a:p>
             <a:pPr marL="342900" indent="-342900">
@@ -7964,7 +8259,15 @@
                   <a:schemeClr val="tx1"/>
                 </a:solidFill>
               </a:rPr>
-              <a:t>Each Thread is an instance of a class </a:t>
+              <a:t>Each Thread is an instance of a class «</a:t>
+            </a:r>
+            <a:r>
+              <a:rPr lang="en-US" dirty="0" err="1" smtClean="0">
+                <a:solidFill>
+                  <a:schemeClr val="tx1"/>
+                </a:solidFill>
+              </a:rPr>
+              <a:t>SpecializedCallable</a:t>
             </a:r>
             <a:r>
               <a:rPr lang="en-US" dirty="0" smtClean="0">
@@ -7972,31 +8275,7 @@
                   <a:schemeClr val="tx1"/>
                 </a:solidFill>
               </a:rPr>
-              <a:t>«</a:t>
-            </a:r>
-            <a:r>
-              <a:rPr lang="en-US" dirty="0" err="1" smtClean="0">
-                <a:solidFill>
-                  <a:schemeClr val="tx1"/>
-                </a:solidFill>
-              </a:rPr>
-              <a:t>SpecializedCallable</a:t>
-            </a:r>
-            <a:r>
-              <a:rPr lang="en-US" dirty="0" smtClean="0">
-                <a:solidFill>
-                  <a:schemeClr val="tx1"/>
-                </a:solidFill>
-              </a:rPr>
-              <a:t>», </a:t>
-            </a:r>
-            <a:r>
-              <a:rPr lang="en-US" dirty="0" smtClean="0">
-                <a:solidFill>
-                  <a:schemeClr val="tx1"/>
-                </a:solidFill>
-              </a:rPr>
-              <a:t>which implements Callable interface.</a:t>
+              <a:t>», which implements Callable interface.</a:t>
             </a:r>
             <a:endParaRPr lang="en-US" dirty="0">
               <a:solidFill>
@@ -8625,7 +8904,15 @@
                   <a:schemeClr val="tx1"/>
                 </a:solidFill>
               </a:rPr>
-              <a:t> interface</a:t>
+              <a:t>&lt;V&gt; </a:t>
+            </a:r>
+            <a:r>
+              <a:rPr lang="en-US" dirty="0" smtClean="0">
+                <a:solidFill>
+                  <a:schemeClr val="tx1"/>
+                </a:solidFill>
+              </a:rPr>
+              <a:t>interface</a:t>
             </a:r>
           </a:p>
           <a:p>
@@ -8791,7 +9078,7 @@
         </p:spPr>
         <p:txBody>
           <a:bodyPr>
-            <a:normAutofit fontScale="92500" lnSpcReduction="10000"/>
+            <a:normAutofit/>
           </a:bodyPr>
           <a:lstStyle/>
           <a:p>
@@ -8827,7 +9114,15 @@
                   <a:schemeClr val="tx1"/>
                 </a:solidFill>
               </a:rPr>
-              <a:t> interface: an extension of </a:t>
+              <a:t>&lt;V&gt; </a:t>
+            </a:r>
+            <a:r>
+              <a:rPr lang="fr-CH" dirty="0" smtClean="0">
+                <a:solidFill>
+                  <a:schemeClr val="tx1"/>
+                </a:solidFill>
+              </a:rPr>
+              <a:t>interface: an extension of </a:t>
             </a:r>
             <a:r>
               <a:rPr lang="fr-CH" dirty="0" err="1" smtClean="0">
@@ -8857,7 +9152,7 @@
                   <a:schemeClr val="tx1"/>
                 </a:solidFill>
               </a:rPr>
-              <a:t>We</a:t>
+              <a:t>Provides</a:t>
             </a:r>
             <a:r>
               <a:rPr lang="fr-CH" dirty="0" smtClean="0">
@@ -8873,7 +9168,7 @@
                   <a:schemeClr val="tx1"/>
                 </a:solidFill>
               </a:rPr>
-              <a:t>want</a:t>
+              <a:t>protected</a:t>
             </a:r>
             <a:r>
               <a:rPr lang="fr-CH" dirty="0" smtClean="0">
@@ -8881,7 +9176,7 @@
                   <a:schemeClr val="tx1"/>
                 </a:solidFill>
               </a:rPr>
-              <a:t> to </a:t>
+              <a:t> </a:t>
             </a:r>
             <a:r>
               <a:rPr lang="fr-CH" dirty="0" err="1" smtClean="0">
@@ -8889,7 +9184,7 @@
                   <a:schemeClr val="tx1"/>
                 </a:solidFill>
               </a:rPr>
-              <a:t>get</a:t>
+              <a:t>methods</a:t>
             </a:r>
             <a:r>
               <a:rPr lang="fr-CH" dirty="0" smtClean="0">
@@ -8897,7 +9192,7 @@
                   <a:schemeClr val="tx1"/>
                 </a:solidFill>
               </a:rPr>
-              <a:t> the </a:t>
+              <a:t> </a:t>
             </a:r>
             <a:r>
               <a:rPr lang="fr-CH" dirty="0" err="1" smtClean="0">
@@ -8905,7 +9200,7 @@
                   <a:schemeClr val="tx1"/>
                 </a:solidFill>
               </a:rPr>
-              <a:t>compute</a:t>
+              <a:t>that</a:t>
             </a:r>
             <a:r>
               <a:rPr lang="fr-CH" dirty="0" smtClean="0">
@@ -8913,7 +9208,7 @@
                   <a:schemeClr val="tx1"/>
                 </a:solidFill>
               </a:rPr>
-              <a:t> an </a:t>
+              <a:t> </a:t>
             </a:r>
             <a:r>
               <a:rPr lang="fr-CH" dirty="0" err="1" smtClean="0">
@@ -8921,10 +9216,10 @@
                   <a:schemeClr val="tx1"/>
                 </a:solidFill>
               </a:rPr>
-              <a:t>Integral</a:t>
-            </a:r>
-            <a:r>
-              <a:rPr lang="fr-CH" dirty="0">
+              <a:t>can</a:t>
+            </a:r>
+            <a:r>
+              <a:rPr lang="fr-CH" dirty="0" smtClean="0">
                 <a:solidFill>
                   <a:schemeClr val="tx1"/>
                 </a:solidFill>
@@ -8932,12 +9227,20 @@
               <a:t> </a:t>
             </a:r>
             <a:r>
+              <a:rPr lang="fr-CH" dirty="0" err="1" smtClean="0">
+                <a:solidFill>
+                  <a:schemeClr val="tx1"/>
+                </a:solidFill>
+              </a:rPr>
+              <a:t>be</a:t>
+            </a:r>
+            <a:r>
               <a:rPr lang="fr-CH" dirty="0" smtClean="0">
                 <a:solidFill>
                   <a:schemeClr val="tx1"/>
                 </a:solidFill>
               </a:rPr>
-              <a:t>in </a:t>
+              <a:t> </a:t>
             </a:r>
             <a:r>
               <a:rPr lang="fr-CH" dirty="0" err="1" smtClean="0">
@@ -8945,7 +9248,7 @@
                   <a:schemeClr val="tx1"/>
                 </a:solidFill>
               </a:rPr>
-              <a:t>order</a:t>
+              <a:t>reimplemented</a:t>
             </a:r>
             <a:r>
               <a:rPr lang="fr-CH" dirty="0" smtClean="0">
@@ -8953,94 +9256,8 @@
                   <a:schemeClr val="tx1"/>
                 </a:solidFill>
               </a:rPr>
-              <a:t> to </a:t>
-            </a:r>
-            <a:r>
-              <a:rPr lang="fr-CH" dirty="0" err="1" smtClean="0">
-                <a:solidFill>
-                  <a:schemeClr val="tx1"/>
-                </a:solidFill>
-              </a:rPr>
-              <a:t>get</a:t>
-            </a:r>
-            <a:r>
-              <a:rPr lang="fr-CH" dirty="0" smtClean="0">
-                <a:solidFill>
-                  <a:schemeClr val="tx1"/>
-                </a:solidFill>
-              </a:rPr>
-              <a:t> Pi and </a:t>
-            </a:r>
-            <a:r>
-              <a:rPr lang="fr-CH" dirty="0" err="1" smtClean="0">
-                <a:solidFill>
-                  <a:schemeClr val="tx1"/>
-                </a:solidFill>
-              </a:rPr>
-              <a:t>we</a:t>
-            </a:r>
-            <a:r>
-              <a:rPr lang="fr-CH" dirty="0" smtClean="0">
-                <a:solidFill>
-                  <a:schemeClr val="tx1"/>
-                </a:solidFill>
-              </a:rPr>
-              <a:t> </a:t>
-            </a:r>
-            <a:r>
-              <a:rPr lang="fr-CH" dirty="0" err="1" smtClean="0">
-                <a:solidFill>
-                  <a:schemeClr val="tx1"/>
-                </a:solidFill>
-              </a:rPr>
-              <a:t>want</a:t>
-            </a:r>
-            <a:r>
-              <a:rPr lang="fr-CH" dirty="0" smtClean="0">
-                <a:solidFill>
-                  <a:schemeClr val="tx1"/>
-                </a:solidFill>
-              </a:rPr>
-              <a:t> to </a:t>
-            </a:r>
-            <a:r>
-              <a:rPr lang="fr-CH" dirty="0" err="1" smtClean="0">
-                <a:solidFill>
-                  <a:schemeClr val="tx1"/>
-                </a:solidFill>
-              </a:rPr>
-              <a:t>compute</a:t>
-            </a:r>
-            <a:r>
-              <a:rPr lang="fr-CH" dirty="0" smtClean="0">
-                <a:solidFill>
-                  <a:schemeClr val="tx1"/>
-                </a:solidFill>
-              </a:rPr>
-              <a:t> as </a:t>
-            </a:r>
-            <a:r>
-              <a:rPr lang="fr-CH" dirty="0" err="1" smtClean="0">
-                <a:solidFill>
-                  <a:schemeClr val="tx1"/>
-                </a:solidFill>
-              </a:rPr>
-              <a:t>fast</a:t>
-            </a:r>
-            <a:r>
-              <a:rPr lang="fr-CH" dirty="0" smtClean="0">
-                <a:solidFill>
-                  <a:schemeClr val="tx1"/>
-                </a:solidFill>
-              </a:rPr>
-              <a:t> as possible.</a:t>
-            </a:r>
-          </a:p>
-          <a:p>
-            <a:pPr marL="342900" indent="-342900">
-              <a:buFont typeface="Wingdings" panose="05000000000000000000" pitchFamily="2" charset="2"/>
-              <a:buChar char="Ø"/>
-            </a:pPr>
+              <a:t>.</a:t>
+            </a:r>
             <a:endParaRPr lang="fr-CH" dirty="0">
               <a:solidFill>
                 <a:schemeClr val="tx1"/>
@@ -9052,258 +9269,105 @@
               <a:buFont typeface="Wingdings" panose="05000000000000000000" pitchFamily="2" charset="2"/>
               <a:buChar char="Ø"/>
             </a:pPr>
+            <a:r>
+              <a:rPr lang="fr-CH" dirty="0" smtClean="0">
+                <a:solidFill>
+                  <a:schemeClr val="tx1"/>
+                </a:solidFill>
+              </a:rPr>
+              <a:t>Can </a:t>
+            </a:r>
+            <a:r>
+              <a:rPr lang="fr-CH" dirty="0" err="1" smtClean="0">
+                <a:solidFill>
+                  <a:schemeClr val="tx1"/>
+                </a:solidFill>
+              </a:rPr>
+              <a:t>be</a:t>
+            </a:r>
+            <a:r>
+              <a:rPr lang="fr-CH" dirty="0" smtClean="0">
+                <a:solidFill>
+                  <a:schemeClr val="tx1"/>
+                </a:solidFill>
+              </a:rPr>
+              <a:t> </a:t>
+            </a:r>
+            <a:r>
+              <a:rPr lang="fr-CH" dirty="0" err="1" smtClean="0">
+                <a:solidFill>
+                  <a:schemeClr val="tx1"/>
+                </a:solidFill>
+              </a:rPr>
+              <a:t>extended</a:t>
+            </a:r>
+            <a:r>
+              <a:rPr lang="fr-CH" dirty="0" smtClean="0">
+                <a:solidFill>
+                  <a:schemeClr val="tx1"/>
+                </a:solidFill>
+              </a:rPr>
+              <a:t>.</a:t>
+            </a:r>
             <a:endParaRPr lang="fr-CH" dirty="0" smtClean="0">
               <a:solidFill>
                 <a:schemeClr val="tx1"/>
               </a:solidFill>
             </a:endParaRPr>
           </a:p>
-          <a:p>
-            <a:pPr marL="342900" indent="-342900">
-              <a:buFont typeface="Wingdings" panose="05000000000000000000" pitchFamily="2" charset="2"/>
-              <a:buChar char="Ø"/>
-            </a:pPr>
-            <a:r>
-              <a:rPr lang="fr-CH" dirty="0" err="1" smtClean="0">
-                <a:solidFill>
-                  <a:schemeClr val="tx1"/>
-                </a:solidFill>
-              </a:rPr>
-              <a:t>Instead</a:t>
-            </a:r>
-            <a:r>
-              <a:rPr lang="fr-CH" dirty="0" smtClean="0">
-                <a:solidFill>
-                  <a:schemeClr val="tx1"/>
-                </a:solidFill>
-              </a:rPr>
-              <a:t> of </a:t>
-            </a:r>
-            <a:r>
-              <a:rPr lang="fr-CH" dirty="0" err="1" smtClean="0">
-                <a:solidFill>
-                  <a:schemeClr val="tx1"/>
-                </a:solidFill>
-              </a:rPr>
-              <a:t>sequential</a:t>
-            </a:r>
-            <a:r>
-              <a:rPr lang="fr-CH" dirty="0" smtClean="0">
-                <a:solidFill>
-                  <a:schemeClr val="tx1"/>
-                </a:solidFill>
-              </a:rPr>
-              <a:t> </a:t>
-            </a:r>
-            <a:r>
-              <a:rPr lang="fr-CH" dirty="0" err="1" smtClean="0">
-                <a:solidFill>
-                  <a:schemeClr val="tx1"/>
-                </a:solidFill>
-              </a:rPr>
-              <a:t>programming</a:t>
-            </a:r>
-            <a:r>
-              <a:rPr lang="fr-CH" dirty="0" smtClean="0">
-                <a:solidFill>
-                  <a:schemeClr val="tx1"/>
-                </a:solidFill>
-              </a:rPr>
-              <a:t>, </a:t>
-            </a:r>
-            <a:r>
-              <a:rPr lang="fr-CH" dirty="0" err="1">
-                <a:solidFill>
-                  <a:schemeClr val="tx1"/>
-                </a:solidFill>
-              </a:rPr>
-              <a:t>w</a:t>
-            </a:r>
-            <a:r>
-              <a:rPr lang="fr-CH" dirty="0" err="1" smtClean="0">
-                <a:solidFill>
-                  <a:schemeClr val="tx1"/>
-                </a:solidFill>
-              </a:rPr>
-              <a:t>e</a:t>
-            </a:r>
-            <a:r>
-              <a:rPr lang="fr-CH" dirty="0" smtClean="0">
-                <a:solidFill>
-                  <a:schemeClr val="tx1"/>
-                </a:solidFill>
-              </a:rPr>
-              <a:t> split the computation in </a:t>
-            </a:r>
-            <a:r>
-              <a:rPr lang="fr-CH" dirty="0" err="1" smtClean="0">
-                <a:solidFill>
-                  <a:schemeClr val="tx1"/>
-                </a:solidFill>
-              </a:rPr>
-              <a:t>differents</a:t>
-            </a:r>
-            <a:r>
-              <a:rPr lang="fr-CH" dirty="0" smtClean="0">
-                <a:solidFill>
-                  <a:schemeClr val="tx1"/>
-                </a:solidFill>
-              </a:rPr>
-              <a:t> Threads.</a:t>
-            </a:r>
-          </a:p>
-          <a:p>
-            <a:pPr marL="342900" indent="-342900">
-              <a:buFont typeface="Wingdings" panose="05000000000000000000" pitchFamily="2" charset="2"/>
-              <a:buChar char="Ø"/>
-            </a:pPr>
-            <a:r>
-              <a:rPr lang="fr-CH" dirty="0" err="1" smtClean="0">
-                <a:solidFill>
-                  <a:schemeClr val="tx1"/>
-                </a:solidFill>
-              </a:rPr>
-              <a:t>Each</a:t>
-            </a:r>
-            <a:r>
-              <a:rPr lang="fr-CH" dirty="0" smtClean="0">
-                <a:solidFill>
-                  <a:schemeClr val="tx1"/>
-                </a:solidFill>
-              </a:rPr>
-              <a:t> Thread </a:t>
-            </a:r>
-            <a:r>
-              <a:rPr lang="fr-CH" dirty="0" err="1" smtClean="0">
-                <a:solidFill>
-                  <a:schemeClr val="tx1"/>
-                </a:solidFill>
-              </a:rPr>
-              <a:t>is</a:t>
-            </a:r>
-            <a:r>
-              <a:rPr lang="fr-CH" dirty="0" smtClean="0">
-                <a:solidFill>
-                  <a:schemeClr val="tx1"/>
-                </a:solidFill>
-              </a:rPr>
-              <a:t> an instance of a class «</a:t>
-            </a:r>
-            <a:r>
-              <a:rPr lang="fr-CH" dirty="0" err="1" smtClean="0">
-                <a:solidFill>
-                  <a:schemeClr val="tx1"/>
-                </a:solidFill>
-              </a:rPr>
-              <a:t>CallableExemple</a:t>
-            </a:r>
-            <a:r>
-              <a:rPr lang="fr-CH" dirty="0" smtClean="0">
-                <a:solidFill>
-                  <a:schemeClr val="tx1"/>
-                </a:solidFill>
-              </a:rPr>
-              <a:t>», </a:t>
-            </a:r>
-            <a:r>
-              <a:rPr lang="fr-CH" dirty="0" err="1" smtClean="0">
-                <a:solidFill>
-                  <a:schemeClr val="tx1"/>
-                </a:solidFill>
-              </a:rPr>
-              <a:t>which</a:t>
-            </a:r>
-            <a:r>
-              <a:rPr lang="fr-CH" dirty="0" smtClean="0">
-                <a:solidFill>
-                  <a:schemeClr val="tx1"/>
-                </a:solidFill>
-              </a:rPr>
-              <a:t> </a:t>
-            </a:r>
-            <a:r>
-              <a:rPr lang="fr-CH" dirty="0" err="1" smtClean="0">
-                <a:solidFill>
-                  <a:schemeClr val="tx1"/>
-                </a:solidFill>
-              </a:rPr>
-              <a:t>implements</a:t>
-            </a:r>
-            <a:r>
-              <a:rPr lang="fr-CH" dirty="0" smtClean="0">
-                <a:solidFill>
-                  <a:schemeClr val="tx1"/>
-                </a:solidFill>
-              </a:rPr>
-              <a:t> </a:t>
-            </a:r>
-            <a:r>
-              <a:rPr lang="fr-CH" dirty="0" err="1" smtClean="0">
-                <a:solidFill>
-                  <a:schemeClr val="tx1"/>
-                </a:solidFill>
-              </a:rPr>
-              <a:t>Callable</a:t>
-            </a:r>
-            <a:r>
-              <a:rPr lang="fr-CH" dirty="0" smtClean="0">
-                <a:solidFill>
-                  <a:schemeClr val="tx1"/>
-                </a:solidFill>
-              </a:rPr>
-              <a:t> interface.</a:t>
-            </a:r>
+        </p:txBody>
+      </p:sp>
+      <p:sp>
+        <p:nvSpPr>
+          <p:cNvPr id="5" name="Espace réservé du pied de page 4"/>
+          <p:cNvSpPr>
+            <a:spLocks noGrp="1"/>
+          </p:cNvSpPr>
+          <p:nvPr>
+            <p:ph type="ftr" sz="quarter" idx="11"/>
+          </p:nvPr>
+        </p:nvSpPr>
+        <p:spPr/>
+        <p:txBody>
+          <a:bodyPr/>
+          <a:lstStyle/>
+          <a:p>
+            <a:r>
+              <a:rPr lang="fr-CH" smtClean="0"/>
+              <a:t>Bandelier Matthieu, Mut Horia</a:t>
+            </a:r>
+            <a:endParaRPr lang="fr-CH"/>
+          </a:p>
+        </p:txBody>
+      </p:sp>
+      <p:sp>
+        <p:nvSpPr>
+          <p:cNvPr id="6" name="Espace réservé du numéro de diapositive 5"/>
+          <p:cNvSpPr>
+            <a:spLocks noGrp="1"/>
+          </p:cNvSpPr>
+          <p:nvPr>
+            <p:ph type="sldNum" sz="quarter" idx="12"/>
+          </p:nvPr>
+        </p:nvSpPr>
+        <p:spPr/>
+        <p:txBody>
+          <a:bodyPr/>
+          <a:lstStyle/>
+          <a:p>
+            <a:fld id="{5AB2EE26-ED9C-4A04-B78D-673AD8430FF9}" type="slidenum">
+              <a:rPr lang="fr-CH" smtClean="0">
+                <a:solidFill>
+                  <a:schemeClr val="tx1"/>
+                </a:solidFill>
+              </a:rPr>
+              <a:t>8</a:t>
+            </a:fld>
             <a:endParaRPr lang="fr-CH" dirty="0">
               <a:solidFill>
                 <a:schemeClr val="tx1"/>
               </a:solidFill>
             </a:endParaRPr>
-          </a:p>
-        </p:txBody>
-      </p:sp>
-      <p:sp>
-        <p:nvSpPr>
-          <p:cNvPr id="5" name="Espace réservé du pied de page 4"/>
-          <p:cNvSpPr>
-            <a:spLocks noGrp="1"/>
-          </p:cNvSpPr>
-          <p:nvPr>
-            <p:ph type="ftr" sz="quarter" idx="11"/>
-          </p:nvPr>
-        </p:nvSpPr>
-        <p:spPr/>
-        <p:txBody>
-          <a:bodyPr/>
-          <a:lstStyle/>
-          <a:p>
-            <a:r>
-              <a:rPr lang="fr-CH" smtClean="0"/>
-              <a:t>Bandelier Matthieu, Mut Horia</a:t>
-            </a:r>
-            <a:endParaRPr lang="fr-CH"/>
-          </a:p>
-        </p:txBody>
-      </p:sp>
-      <p:sp>
-        <p:nvSpPr>
-          <p:cNvPr id="6" name="Espace réservé du numéro de diapositive 5"/>
-          <p:cNvSpPr>
-            <a:spLocks noGrp="1"/>
-          </p:cNvSpPr>
-          <p:nvPr>
-            <p:ph type="sldNum" sz="quarter" idx="12"/>
-          </p:nvPr>
-        </p:nvSpPr>
-        <p:spPr/>
-        <p:txBody>
-          <a:bodyPr/>
-          <a:lstStyle/>
-          <a:p>
-            <a:fld id="{5AB2EE26-ED9C-4A04-B78D-673AD8430FF9}" type="slidenum">
-              <a:rPr lang="fr-CH" smtClean="0"/>
-              <a:t>8</a:t>
-            </a:fld>
-            <a:endParaRPr lang="fr-CH"/>
           </a:p>
         </p:txBody>
       </p:sp>
@@ -9393,8 +9457,8 @@
         </p:nvSpPr>
         <p:spPr>
           <a:xfrm>
-            <a:off x="684212" y="2286001"/>
-            <a:ext cx="8535988" cy="3643312"/>
+            <a:off x="684212" y="2171700"/>
+            <a:ext cx="5217055" cy="3757613"/>
           </a:xfrm>
         </p:spPr>
         <p:txBody>
@@ -9404,123 +9468,212 @@
           <a:lstStyle/>
           <a:p>
             <a:pPr marL="342900" indent="-342900">
-              <a:buFontTx/>
-              <a:buChar char="-"/>
+              <a:buFont typeface="Wingdings" panose="05000000000000000000" pitchFamily="2" charset="2"/>
+              <a:buChar char="Ø"/>
             </a:pPr>
             <a:r>
-              <a:rPr lang="fr-CH" dirty="0" err="1"/>
+              <a:rPr lang="fr-CH" dirty="0" err="1" smtClean="0">
+                <a:solidFill>
+                  <a:schemeClr val="tx1"/>
+                </a:solidFill>
+              </a:rPr>
               <a:t>We</a:t>
             </a:r>
             <a:r>
-              <a:rPr lang="fr-CH" dirty="0"/>
+              <a:rPr lang="fr-CH" dirty="0" smtClean="0">
+                <a:solidFill>
+                  <a:schemeClr val="tx1"/>
+                </a:solidFill>
+              </a:rPr>
               <a:t> </a:t>
             </a:r>
             <a:r>
-              <a:rPr lang="fr-CH" dirty="0" err="1"/>
+              <a:rPr lang="fr-CH" dirty="0" err="1" smtClean="0">
+                <a:solidFill>
+                  <a:schemeClr val="tx1"/>
+                </a:solidFill>
+              </a:rPr>
               <a:t>want</a:t>
             </a:r>
             <a:r>
-              <a:rPr lang="fr-CH" dirty="0"/>
+              <a:rPr lang="fr-CH" dirty="0" smtClean="0">
+                <a:solidFill>
+                  <a:schemeClr val="tx1"/>
+                </a:solidFill>
+              </a:rPr>
               <a:t> to </a:t>
             </a:r>
             <a:r>
-              <a:rPr lang="fr-CH" dirty="0" err="1"/>
-              <a:t>get</a:t>
-            </a:r>
-            <a:r>
-              <a:rPr lang="fr-CH" dirty="0"/>
+              <a:rPr lang="fr-CH" dirty="0" err="1" smtClean="0">
+                <a:solidFill>
+                  <a:schemeClr val="tx1"/>
+                </a:solidFill>
+              </a:rPr>
+              <a:t>be</a:t>
+            </a:r>
+            <a:r>
+              <a:rPr lang="fr-CH" dirty="0" smtClean="0">
+                <a:solidFill>
+                  <a:schemeClr val="tx1"/>
+                </a:solidFill>
+              </a:rPr>
+              <a:t> able to </a:t>
+            </a:r>
+            <a:r>
+              <a:rPr lang="fr-CH" dirty="0" err="1" smtClean="0">
+                <a:solidFill>
+                  <a:schemeClr val="tx1"/>
+                </a:solidFill>
+              </a:rPr>
+              <a:t>modify</a:t>
+            </a:r>
+            <a:r>
+              <a:rPr lang="fr-CH" dirty="0" smtClean="0">
+                <a:solidFill>
+                  <a:schemeClr val="tx1"/>
+                </a:solidFill>
+              </a:rPr>
               <a:t> the </a:t>
             </a:r>
             <a:r>
-              <a:rPr lang="fr-CH" dirty="0" err="1" smtClean="0"/>
-              <a:t>computed</a:t>
-            </a:r>
-            <a:r>
-              <a:rPr lang="fr-CH" dirty="0" smtClean="0"/>
+              <a:rPr lang="fr-CH" dirty="0" err="1" smtClean="0">
+                <a:solidFill>
+                  <a:schemeClr val="tx1"/>
+                </a:solidFill>
+              </a:rPr>
+              <a:t>task’s</a:t>
+            </a:r>
+            <a:r>
+              <a:rPr lang="fr-CH" dirty="0">
+                <a:solidFill>
+                  <a:schemeClr val="tx1"/>
+                </a:solidFill>
+              </a:rPr>
               <a:t> </a:t>
             </a:r>
             <a:r>
-              <a:rPr lang="fr-CH" dirty="0" err="1" smtClean="0"/>
-              <a:t>results</a:t>
-            </a:r>
-            <a:r>
-              <a:rPr lang="fr-CH" dirty="0" smtClean="0"/>
-              <a:t>, in </a:t>
-            </a:r>
-            <a:r>
-              <a:rPr lang="fr-CH" dirty="0" err="1"/>
-              <a:t>order</a:t>
-            </a:r>
-            <a:r>
-              <a:rPr lang="fr-CH" dirty="0"/>
-              <a:t> to </a:t>
-            </a:r>
-            <a:r>
-              <a:rPr lang="fr-CH" dirty="0" err="1"/>
-              <a:t>get</a:t>
-            </a:r>
-            <a:r>
-              <a:rPr lang="fr-CH" dirty="0"/>
+              <a:rPr lang="fr-CH" dirty="0" err="1" smtClean="0">
+                <a:solidFill>
+                  <a:schemeClr val="tx1"/>
+                </a:solidFill>
+              </a:rPr>
+              <a:t>Callable</a:t>
+            </a:r>
+            <a:r>
+              <a:rPr lang="fr-CH" dirty="0" smtClean="0">
+                <a:solidFill>
+                  <a:schemeClr val="tx1"/>
+                </a:solidFill>
+              </a:rPr>
+              <a:t> to show the computations.</a:t>
+            </a:r>
+            <a:endParaRPr lang="fr-CH" dirty="0" smtClean="0">
+              <a:solidFill>
+                <a:schemeClr val="tx1"/>
+              </a:solidFill>
+            </a:endParaRPr>
+          </a:p>
+          <a:p>
+            <a:pPr marL="342900" indent="-342900">
+              <a:buFont typeface="Wingdings" panose="05000000000000000000" pitchFamily="2" charset="2"/>
+              <a:buChar char="Ø"/>
+            </a:pPr>
+            <a:r>
+              <a:rPr lang="fr-CH" dirty="0" err="1" smtClean="0">
+                <a:solidFill>
+                  <a:schemeClr val="tx1"/>
+                </a:solidFill>
+              </a:rPr>
+              <a:t>We</a:t>
+            </a:r>
+            <a:r>
+              <a:rPr lang="fr-CH" dirty="0" smtClean="0">
+                <a:solidFill>
+                  <a:schemeClr val="tx1"/>
+                </a:solidFill>
+              </a:rPr>
               <a:t> </a:t>
             </a:r>
             <a:r>
-              <a:rPr lang="fr-CH" dirty="0" smtClean="0"/>
-              <a:t>Pi.</a:t>
-            </a:r>
-          </a:p>
-          <a:p>
-            <a:pPr marL="342900" indent="-342900">
-              <a:buFontTx/>
-              <a:buChar char="-"/>
-            </a:pPr>
-            <a:endParaRPr lang="fr-CH" dirty="0" smtClean="0"/>
-          </a:p>
-          <a:p>
-            <a:pPr marL="342900" indent="-342900">
-              <a:buFontTx/>
-              <a:buChar char="-"/>
-            </a:pPr>
-            <a:r>
-              <a:rPr lang="fr-CH" dirty="0" err="1" smtClean="0"/>
-              <a:t>We</a:t>
-            </a:r>
-            <a:r>
-              <a:rPr lang="fr-CH" dirty="0" smtClean="0"/>
+              <a:rPr lang="fr-CH" dirty="0" err="1" smtClean="0">
+                <a:solidFill>
+                  <a:schemeClr val="tx1"/>
+                </a:solidFill>
+              </a:rPr>
+              <a:t>can</a:t>
+            </a:r>
+            <a:r>
+              <a:rPr lang="fr-CH" dirty="0" smtClean="0">
+                <a:solidFill>
+                  <a:schemeClr val="tx1"/>
+                </a:solidFill>
+              </a:rPr>
               <a:t> </a:t>
             </a:r>
             <a:r>
-              <a:rPr lang="fr-CH" dirty="0" err="1" smtClean="0"/>
-              <a:t>could</a:t>
-            </a:r>
-            <a:r>
-              <a:rPr lang="fr-CH" dirty="0" smtClean="0"/>
-              <a:t> do </a:t>
-            </a:r>
-            <a:r>
-              <a:rPr lang="fr-CH" dirty="0" err="1" smtClean="0"/>
+              <a:rPr lang="fr-CH" dirty="0" smtClean="0">
+                <a:solidFill>
+                  <a:schemeClr val="tx1"/>
+                </a:solidFill>
+              </a:rPr>
+              <a:t>do </a:t>
+            </a:r>
+            <a:r>
+              <a:rPr lang="fr-CH" dirty="0" err="1" smtClean="0">
+                <a:solidFill>
+                  <a:schemeClr val="tx1"/>
+                </a:solidFill>
+              </a:rPr>
               <a:t>that</a:t>
             </a:r>
             <a:r>
-              <a:rPr lang="fr-CH" dirty="0" smtClean="0"/>
+              <a:rPr lang="fr-CH" dirty="0" smtClean="0">
+                <a:solidFill>
+                  <a:schemeClr val="tx1"/>
+                </a:solidFill>
+              </a:rPr>
               <a:t> </a:t>
             </a:r>
             <a:r>
-              <a:rPr lang="fr-CH" dirty="0" err="1" smtClean="0"/>
-              <a:t>with</a:t>
-            </a:r>
-            <a:r>
-              <a:rPr lang="fr-CH" dirty="0" smtClean="0"/>
+              <a:rPr lang="fr-CH" dirty="0" smtClean="0">
+                <a:solidFill>
+                  <a:schemeClr val="tx1"/>
+                </a:solidFill>
+              </a:rPr>
+              <a:t>by </a:t>
+            </a:r>
+            <a:r>
+              <a:rPr lang="fr-CH" dirty="0" err="1" smtClean="0">
+                <a:solidFill>
+                  <a:schemeClr val="tx1"/>
+                </a:solidFill>
+              </a:rPr>
+              <a:t>extending</a:t>
+            </a:r>
+            <a:r>
+              <a:rPr lang="fr-CH" dirty="0" smtClean="0">
+                <a:solidFill>
+                  <a:schemeClr val="tx1"/>
+                </a:solidFill>
+              </a:rPr>
               <a:t> </a:t>
             </a:r>
             <a:r>
-              <a:rPr lang="fr-CH" dirty="0" err="1" smtClean="0"/>
+              <a:rPr lang="fr-CH" dirty="0" err="1" smtClean="0">
+                <a:solidFill>
+                  <a:schemeClr val="tx1"/>
+                </a:solidFill>
+              </a:rPr>
               <a:t>FutureTask</a:t>
             </a:r>
             <a:r>
-              <a:rPr lang="fr-CH" dirty="0" smtClean="0"/>
-              <a:t> class</a:t>
-            </a:r>
-            <a:endParaRPr lang="fr-CH" dirty="0"/>
+              <a:rPr lang="fr-CH" dirty="0" smtClean="0">
+                <a:solidFill>
+                  <a:schemeClr val="tx1"/>
+                </a:solidFill>
+              </a:rPr>
+              <a:t>.</a:t>
+            </a:r>
           </a:p>
         </p:txBody>
       </p:sp>
@@ -9563,13 +9716,51 @@
           <a:lstStyle/>
           <a:p>
             <a:fld id="{5AB2EE26-ED9C-4A04-B78D-673AD8430FF9}" type="slidenum">
-              <a:rPr lang="fr-CH" smtClean="0"/>
+              <a:rPr lang="fr-CH" smtClean="0">
+                <a:solidFill>
+                  <a:schemeClr val="tx1"/>
+                </a:solidFill>
+              </a:rPr>
               <a:t>9</a:t>
             </a:fld>
-            <a:endParaRPr lang="fr-CH"/>
-          </a:p>
-        </p:txBody>
-      </p:sp>
+            <a:endParaRPr lang="fr-CH" dirty="0">
+              <a:solidFill>
+                <a:schemeClr val="tx1"/>
+              </a:solidFill>
+            </a:endParaRPr>
+          </a:p>
+        </p:txBody>
+      </p:sp>
+      <p:pic>
+        <p:nvPicPr>
+          <p:cNvPr id="3" name="Image 2"/>
+          <p:cNvPicPr>
+            <a:picLocks noChangeAspect="1"/>
+          </p:cNvPicPr>
+          <p:nvPr/>
+        </p:nvPicPr>
+        <p:blipFill>
+          <a:blip r:embed="rId2">
+            <a:extLst>
+              <a:ext uri="{28A0092B-C50C-407E-A947-70E740481C1C}">
+                <a14:useLocalDpi xmlns:a14="http://schemas.microsoft.com/office/drawing/2010/main" val="0"/>
+              </a:ext>
+            </a:extLst>
+          </a:blip>
+          <a:stretch>
+            <a:fillRect/>
+          </a:stretch>
+        </p:blipFill>
+        <p:spPr>
+          <a:xfrm>
+            <a:off x="5713413" y="1683214"/>
+            <a:ext cx="5372850" cy="4734586"/>
+          </a:xfrm>
+          <a:prstGeom prst="rect">
+            <a:avLst/>
+          </a:prstGeom>
+        </p:spPr>
+      </p:pic>
     </p:spTree>
     <p:extLst>
       <p:ext uri="{BB962C8B-B14F-4D97-AF65-F5344CB8AC3E}">

</xml_diff>

<commit_message>
mat presentation maj des images
</commit_message>
<xml_diff>
--- a/presentation/CallableFutureTask.pptx
+++ b/presentation/CallableFutureTask.pptx
@@ -6245,15 +6245,7 @@
                   <a:schemeClr val="tx1"/>
                 </a:solidFill>
               </a:rPr>
-              <a:t>task</a:t>
-            </a:r>
-            <a:r>
-              <a:rPr lang="fr-CH" dirty="0" err="1" smtClean="0">
-                <a:solidFill>
-                  <a:schemeClr val="tx1"/>
-                </a:solidFill>
-              </a:rPr>
-              <a:t>’s</a:t>
+              <a:t>task’s</a:t>
             </a:r>
             <a:r>
               <a:rPr lang="fr-CH" dirty="0" smtClean="0">
@@ -7185,22 +7177,13 @@
               <a:buChar char="Ø"/>
             </a:pPr>
             <a:r>
-              <a:rPr lang="fr-CH" dirty="0" smtClean="0"/>
-              <a:t>Informations : </a:t>
-            </a:r>
-            <a:r>
               <a:rPr lang="fr-CH" dirty="0">
-                <a:hlinkClick r:id="rId2"/>
-              </a:rPr>
-              <a:t>http://</a:t>
-            </a:r>
-            <a:r>
-              <a:rPr lang="fr-CH" dirty="0" smtClean="0">
-                <a:hlinkClick r:id="rId2"/>
-              </a:rPr>
-              <a:t>www.journaldev.com/1162/java-multi-threading-concurrency-interview-questions-with-answers#callable-future</a:t>
-            </a:r>
-            <a:endParaRPr lang="fr-CH" dirty="0" smtClean="0"/>
+                <a:solidFill>
+                  <a:schemeClr val="tx1"/>
+                </a:solidFill>
+              </a:rPr>
+              <a:t>Informations : http://www.journaldev.com/1162/java-multi-threading-concurrency-interview-questions-with-answers#callable-future</a:t>
+            </a:r>
           </a:p>
           <a:p>
             <a:pPr marL="342900" indent="-342900">
@@ -7208,26 +7191,13 @@
               <a:buChar char="Ø"/>
             </a:pPr>
             <a:r>
-              <a:rPr lang="fr-CH" dirty="0" smtClean="0"/>
-              <a:t>Code </a:t>
-            </a:r>
-            <a:r>
-              <a:rPr lang="fr-CH" dirty="0"/>
-              <a:t>: </a:t>
-            </a:r>
-            <a:r>
               <a:rPr lang="fr-CH" dirty="0">
-                <a:hlinkClick r:id="rId3"/>
-              </a:rPr>
-              <a:t>http://</a:t>
-            </a:r>
-            <a:r>
-              <a:rPr lang="fr-CH" dirty="0" smtClean="0">
-                <a:hlinkClick r:id="rId3"/>
-              </a:rPr>
-              <a:t>www.journaldev.com/1090/java-callable-future-example</a:t>
-            </a:r>
-            <a:endParaRPr lang="fr-CH" dirty="0" smtClean="0"/>
+                <a:solidFill>
+                  <a:schemeClr val="tx1"/>
+                </a:solidFill>
+              </a:rPr>
+              <a:t>Code : http://www.journaldev.com/1090/java-callable-future-example</a:t>
+            </a:r>
           </a:p>
           <a:p>
             <a:pPr marL="342900" indent="-342900">
@@ -7235,7 +7205,11 @@
               <a:buChar char="Ø"/>
             </a:pPr>
             <a:r>
-              <a:rPr lang="fr-CH" dirty="0" smtClean="0"/>
+              <a:rPr lang="fr-CH" dirty="0">
+                <a:solidFill>
+                  <a:schemeClr val="tx1"/>
+                </a:solidFill>
+              </a:rPr>
               <a:t>API :</a:t>
             </a:r>
           </a:p>
@@ -7246,17 +7220,12 @@
             </a:pPr>
             <a:r>
               <a:rPr lang="fr-CH" dirty="0">
-                <a:hlinkClick r:id="rId4"/>
-              </a:rPr>
-              <a:t>https://</a:t>
-            </a:r>
-            <a:r>
-              <a:rPr lang="fr-CH" dirty="0" smtClean="0">
-                <a:hlinkClick r:id="rId4"/>
-              </a:rPr>
-              <a:t>docs.oracle.com/javase/7/docs/api/java/util/concurrent/Callable.html</a:t>
-            </a:r>
-            <a:endParaRPr lang="fr-CH" dirty="0" smtClean="0"/>
+                <a:solidFill>
+                  <a:schemeClr val="tx1"/>
+                </a:solidFill>
+              </a:rPr>
+              <a:t>https://docs.oracle.com/javase/7/docs/api/java/util/concurrent/Callable.html</a:t>
+            </a:r>
           </a:p>
           <a:p>
             <a:pPr marL="800100" lvl="1" indent="-342900">
@@ -7265,17 +7234,12 @@
             </a:pPr>
             <a:r>
               <a:rPr lang="fr-CH" dirty="0">
-                <a:hlinkClick r:id="rId5"/>
-              </a:rPr>
-              <a:t>http://</a:t>
-            </a:r>
-            <a:r>
-              <a:rPr lang="fr-CH" dirty="0" smtClean="0">
-                <a:hlinkClick r:id="rId5"/>
-              </a:rPr>
-              <a:t>docs.oracle.com/javase/7/docs/api/java/util/concurrent/FutureTask.html</a:t>
-            </a:r>
-            <a:endParaRPr lang="fr-CH" dirty="0" smtClean="0"/>
+                <a:solidFill>
+                  <a:schemeClr val="tx1"/>
+                </a:solidFill>
+              </a:rPr>
+              <a:t>http://docs.oracle.com/javase/7/docs/api/java/util/concurrent/FutureTask.html</a:t>
+            </a:r>
           </a:p>
         </p:txBody>
       </p:sp>
@@ -8506,7 +8470,7 @@
       </p:sp>
       <p:pic>
         <p:nvPicPr>
-          <p:cNvPr id="7" name="Image 6"/>
+          <p:cNvPr id="3" name="Image 2"/>
           <p:cNvPicPr>
             <a:picLocks noChangeAspect="1"/>
           </p:cNvPicPr>
@@ -8526,8 +8490,8 @@
         </p:blipFill>
         <p:spPr>
           <a:xfrm>
-            <a:off x="684211" y="1901764"/>
-            <a:ext cx="9859963" cy="4635561"/>
+            <a:off x="684211" y="1210978"/>
+            <a:ext cx="8535989" cy="5399868"/>
           </a:xfrm>
           <a:prstGeom prst="rect">
             <a:avLst/>
@@ -8627,8 +8591,8 @@
         </p:nvSpPr>
         <p:spPr>
           <a:xfrm>
-            <a:off x="684212" y="2286001"/>
-            <a:ext cx="8535988" cy="3643312"/>
+            <a:off x="684212" y="1624388"/>
+            <a:ext cx="8535988" cy="4304925"/>
           </a:xfrm>
         </p:spPr>
         <p:txBody>
@@ -8636,6 +8600,23 @@
             <a:normAutofit/>
           </a:bodyPr>
           <a:lstStyle/>
+          <a:p>
+            <a:r>
+              <a:rPr lang="fr-CH" dirty="0" smtClean="0">
+                <a:solidFill>
+                  <a:schemeClr val="tx1"/>
+                </a:solidFill>
+              </a:rPr>
+              <a:t>		…</a:t>
+            </a:r>
+          </a:p>
+          <a:p>
+            <a:pPr marL="342900" indent="-342900">
+              <a:buFontTx/>
+              <a:buChar char="-"/>
+            </a:pPr>
+            <a:endParaRPr lang="fr-CH" dirty="0"/>
+          </a:p>
           <a:p>
             <a:pPr marL="342900" indent="-342900">
               <a:buFontTx/>
@@ -8721,8 +8702,8 @@
         </p:blipFill>
         <p:spPr>
           <a:xfrm>
-            <a:off x="684212" y="1347239"/>
-            <a:ext cx="9902826" cy="1391749"/>
+            <a:off x="684211" y="1347239"/>
+            <a:ext cx="11131552" cy="1564435"/>
           </a:xfrm>
           <a:prstGeom prst="rect">
             <a:avLst/>
@@ -8731,7 +8712,7 @@
       </p:pic>
       <p:pic>
         <p:nvPicPr>
-          <p:cNvPr id="4" name="Image 3"/>
+          <p:cNvPr id="7" name="Image 6"/>
           <p:cNvPicPr>
             <a:picLocks noChangeAspect="1"/>
           </p:cNvPicPr>
@@ -8751,8 +8732,8 @@
         </p:blipFill>
         <p:spPr>
           <a:xfrm>
-            <a:off x="684212" y="2963912"/>
-            <a:ext cx="8535988" cy="3627014"/>
+            <a:off x="684212" y="3559769"/>
+            <a:ext cx="9045576" cy="2240428"/>
           </a:xfrm>
           <a:prstGeom prst="rect">
             <a:avLst/>
@@ -8904,15 +8885,7 @@
                   <a:schemeClr val="tx1"/>
                 </a:solidFill>
               </a:rPr>
-              <a:t>&lt;V&gt; </a:t>
-            </a:r>
-            <a:r>
-              <a:rPr lang="en-US" dirty="0" smtClean="0">
-                <a:solidFill>
-                  <a:schemeClr val="tx1"/>
-                </a:solidFill>
-              </a:rPr>
-              <a:t>interface</a:t>
+              <a:t>&lt;V&gt; interface</a:t>
             </a:r>
           </a:p>
           <a:p>
@@ -9114,15 +9087,7 @@
                   <a:schemeClr val="tx1"/>
                 </a:solidFill>
               </a:rPr>
-              <a:t>&lt;V&gt; </a:t>
-            </a:r>
-            <a:r>
-              <a:rPr lang="fr-CH" dirty="0" smtClean="0">
-                <a:solidFill>
-                  <a:schemeClr val="tx1"/>
-                </a:solidFill>
-              </a:rPr>
-              <a:t>interface: an extension of </a:t>
+              <a:t>&lt;V&gt; interface: an extension of </a:t>
             </a:r>
             <a:r>
               <a:rPr lang="fr-CH" dirty="0" err="1" smtClean="0">
@@ -9309,11 +9274,6 @@
               </a:rPr>
               <a:t>.</a:t>
             </a:r>
-            <a:endParaRPr lang="fr-CH" dirty="0" smtClean="0">
-              <a:solidFill>
-                <a:schemeClr val="tx1"/>
-              </a:solidFill>
-            </a:endParaRPr>
           </a:p>
         </p:txBody>
       </p:sp>
@@ -9567,11 +9527,6 @@
               </a:rPr>
               <a:t> to show the computations.</a:t>
             </a:r>
-            <a:endParaRPr lang="fr-CH" dirty="0" smtClean="0">
-              <a:solidFill>
-                <a:schemeClr val="tx1"/>
-              </a:solidFill>
-            </a:endParaRPr>
           </a:p>
           <a:p>
             <a:pPr marL="342900" indent="-342900">
@@ -9608,7 +9563,15 @@
                   <a:schemeClr val="tx1"/>
                 </a:solidFill>
               </a:rPr>
-              <a:t> </a:t>
+              <a:t> do </a:t>
+            </a:r>
+            <a:r>
+              <a:rPr lang="fr-CH" dirty="0" err="1" smtClean="0">
+                <a:solidFill>
+                  <a:schemeClr val="tx1"/>
+                </a:solidFill>
+              </a:rPr>
+              <a:t>that</a:t>
             </a:r>
             <a:r>
               <a:rPr lang="fr-CH" dirty="0" smtClean="0">
@@ -9616,31 +9579,7 @@
                   <a:schemeClr val="tx1"/>
                 </a:solidFill>
               </a:rPr>
-              <a:t>do </a:t>
-            </a:r>
-            <a:r>
-              <a:rPr lang="fr-CH" dirty="0" err="1" smtClean="0">
-                <a:solidFill>
-                  <a:schemeClr val="tx1"/>
-                </a:solidFill>
-              </a:rPr>
-              <a:t>that</a:t>
-            </a:r>
-            <a:r>
-              <a:rPr lang="fr-CH" dirty="0" smtClean="0">
-                <a:solidFill>
-                  <a:schemeClr val="tx1"/>
-                </a:solidFill>
-              </a:rPr>
-              <a:t> </a:t>
-            </a:r>
-            <a:r>
-              <a:rPr lang="fr-CH" dirty="0" smtClean="0">
-                <a:solidFill>
-                  <a:schemeClr val="tx1"/>
-                </a:solidFill>
-              </a:rPr>
-              <a:t>by </a:t>
+              <a:t> by </a:t>
             </a:r>
             <a:r>
               <a:rPr lang="fr-CH" dirty="0" err="1" smtClean="0">

</xml_diff>